<commit_message>
Updated links to GitHub
</commit_message>
<xml_diff>
--- a/Holy PowerShell, BATman! - Dogfood Edition.pptx
+++ b/Holy PowerShell, BATman! - Dogfood Edition.pptx
@@ -297,6 +297,10 @@
     </p:extLst>
   </p:cmAuthor>
 </p:cmAuthorLst>
+</file>
+
+<file path=ppt/revisionInfo.xml><?xml version="1.0" encoding="utf-8"?>
+<p1510:revInfo xmlns:a="http://schemas.openxmlformats.org/drawingml/2006/main" xmlns:r="http://schemas.openxmlformats.org/officeDocument/2006/relationships" xmlns:p1510="http://schemas.microsoft.com/office/powerpoint/2015/10/main"/>
 </file>
 
 <file path=ppt/changesInfos/changesInfo1.xml><?xml version="1.0" encoding="utf-8"?>
@@ -19984,8 +19988,8 @@
         </p:nvSpPr>
         <p:spPr>
           <a:xfrm>
-            <a:off x="3759200" y="6248400"/>
-            <a:ext cx="5486400" cy="1938992"/>
+            <a:off x="2235200" y="6019800"/>
+            <a:ext cx="8534400" cy="1938992"/>
           </a:xfrm>
           <a:prstGeom prst="rect">
             <a:avLst/>
@@ -20025,17 +20029,15 @@
                 <a:latin typeface="Calibri" panose="020F0502020204030204" pitchFamily="34" charset="0"/>
                 <a:cs typeface="Calibri" panose="020F0502020204030204" pitchFamily="34" charset="0"/>
               </a:rPr>
-              <a:t>This deck and all examples, code, plus some other goodies, are available at</a:t>
+              <a:t>This deck and all examples, code, plus some other goodies, are available on GitHub:</a:t>
             </a:r>
           </a:p>
           <a:p>
             <a:r>
               <a:rPr lang="en-US" sz="2400" dirty="0">
-                <a:latin typeface="Calibri" panose="020F0502020204030204" pitchFamily="34" charset="0"/>
-                <a:cs typeface="Calibri" panose="020F0502020204030204" pitchFamily="34" charset="0"/>
                 <a:hlinkClick r:id="rId3"/>
               </a:rPr>
-              <a:t>https://tinyurl.com/holypowershell</a:t>
+              <a:t>https://github.com/search?q=holypowershellbatman</a:t>
             </a:r>
             <a:endParaRPr lang="en-US" sz="2400" dirty="0">
               <a:latin typeface="Calibri" panose="020F0502020204030204" pitchFamily="34" charset="0"/>
@@ -20351,7 +20353,7 @@
             <a:pPr marL="0" indent="0"/>
             <a:r>
               <a:rPr lang="en-US" dirty="0"/>
-              <a:t>This presentation, examples, and references will all be available for download after this session at:</a:t>
+              <a:t>This presentation, examples, and references will all be available for download after this session on GitHub.  </a:t>
             </a:r>
           </a:p>
           <a:p>
@@ -20360,8 +20362,12 @@
               <a:rPr lang="en-US" dirty="0">
                 <a:hlinkClick r:id="rId3"/>
               </a:rPr>
-              <a:t>https://tinyurl.com/holypowershell</a:t>
-            </a:r>
+              <a:t>https://github.com/search?q=holypowershellbatman</a:t>
+            </a:r>
+            <a:endParaRPr lang="en-US" dirty="0"/>
+          </a:p>
+          <a:p>
+            <a:pPr marL="0" indent="0"/>
             <a:endParaRPr lang="en-US" dirty="0"/>
           </a:p>
           <a:p>
@@ -22852,12 +22858,6 @@
 </file>
 
 <file path=customXml/item1.xml><?xml version="1.0" encoding="utf-8"?>
-<p:properties xmlns:p="http://schemas.microsoft.com/office/2006/metadata/properties" xmlns:xsi="http://www.w3.org/2001/XMLSchema-instance">
-  <documentManagement/>
-</p:properties>
-</file>
-
-<file path=customXml/item2.xml><?xml version="1.0" encoding="utf-8"?>
 <ct:contentTypeSchema xmlns:ct="http://schemas.microsoft.com/office/2006/metadata/contentType" xmlns:ma="http://schemas.microsoft.com/office/2006/metadata/properties/metaAttributes" ct:_="" ma:_="" ma:contentTypeName="Document" ma:contentTypeID="0x010100BB6608023B9A7B48A805BB64B9C4107A" ma:contentTypeVersion="2" ma:contentTypeDescription="Create a new document." ma:contentTypeScope="" ma:versionID="6a809be3d1d58e3bfd9f5fea2faf4a7a">
   <xsd:schema xmlns:xsd="http://www.w3.org/2001/XMLSchema" xmlns:xs="http://www.w3.org/2001/XMLSchema" xmlns:p="http://schemas.microsoft.com/office/2006/metadata/properties" xmlns:ns2="47432913-b8c9-4474-bbf3-c2a768a85e4e" targetNamespace="http://schemas.microsoft.com/office/2006/metadata/properties" ma:root="true" ma:fieldsID="bab67f1fc774e314d75448ec3efe3c5e" ns2:_="">
     <xsd:import namespace="47432913-b8c9-4474-bbf3-c2a768a85e4e"/>
@@ -23005,6 +23005,12 @@
 </ct:contentTypeSchema>
 </file>
 
+<file path=customXml/item2.xml><?xml version="1.0" encoding="utf-8"?>
+<p:properties xmlns:p="http://schemas.microsoft.com/office/2006/metadata/properties" xmlns:xsi="http://www.w3.org/2001/XMLSchema-instance">
+  <documentManagement/>
+</p:properties>
+</file>
+
 <file path=customXml/item3.xml><?xml version="1.0" encoding="utf-8"?>
 <?mso-contentType ?>
 <FormTemplates xmlns="http://schemas.microsoft.com/sharepoint/v3/contenttype/forms">
@@ -23015,14 +23021,6 @@
 </file>
 
 <file path=customXml/itemProps1.xml><?xml version="1.0" encoding="utf-8"?>
-<ds:datastoreItem xmlns:ds="http://schemas.openxmlformats.org/officeDocument/2006/customXml" ds:itemID="{D4B5E85D-46F6-4351-AF95-A3FF4794550D}">
-  <ds:schemaRefs>
-    <ds:schemaRef ds:uri="http://schemas.microsoft.com/office/2006/metadata/properties"/>
-  </ds:schemaRefs>
-</ds:datastoreItem>
-</file>
-
-<file path=customXml/itemProps2.xml><?xml version="1.0" encoding="utf-8"?>
 <ds:datastoreItem xmlns:ds="http://schemas.openxmlformats.org/officeDocument/2006/customXml" ds:itemID="{80A4EA7D-6E13-43B4-B13D-762CC78E47CA}">
   <ds:schemaRefs>
     <ds:schemaRef ds:uri="http://schemas.microsoft.com/office/2006/metadata/contentType"/>
@@ -23040,6 +23038,14 @@
 </ds:datastoreItem>
 </file>
 
+<file path=customXml/itemProps2.xml><?xml version="1.0" encoding="utf-8"?>
+<ds:datastoreItem xmlns:ds="http://schemas.openxmlformats.org/officeDocument/2006/customXml" ds:itemID="{D4B5E85D-46F6-4351-AF95-A3FF4794550D}">
+  <ds:schemaRefs>
+    <ds:schemaRef ds:uri="http://schemas.microsoft.com/office/2006/metadata/properties"/>
+  </ds:schemaRefs>
+</ds:datastoreItem>
+</file>
+
 <file path=customXml/itemProps3.xml><?xml version="1.0" encoding="utf-8"?>
 <ds:datastoreItem xmlns:ds="http://schemas.openxmlformats.org/officeDocument/2006/customXml" ds:itemID="{AAB2A58B-24A2-451E-85AF-8B801564F1B2}">
   <ds:schemaRefs>

</xml_diff>